<commit_message>
Updated ppt with cronogram, goals and limitations
</commit_message>
<xml_diff>
--- a/docs/01 Project Presentation.pptx
+++ b/docs/01 Project Presentation.pptx
@@ -6,7 +6,7 @@
     <p:sldMasterId id="2147483677" r:id="rId2"/>
   </p:sldMasterIdLst>
   <p:notesMasterIdLst>
-    <p:notesMasterId r:id="rId11"/>
+    <p:notesMasterId r:id="rId15"/>
   </p:notesMasterIdLst>
   <p:sldIdLst>
     <p:sldId id="260" r:id="rId3"/>
@@ -14,9 +14,13 @@
     <p:sldId id="263" r:id="rId5"/>
     <p:sldId id="265" r:id="rId6"/>
     <p:sldId id="266" r:id="rId7"/>
-    <p:sldId id="267" r:id="rId8"/>
-    <p:sldId id="268" r:id="rId9"/>
-    <p:sldId id="262" r:id="rId10"/>
+    <p:sldId id="270" r:id="rId8"/>
+    <p:sldId id="272" r:id="rId9"/>
+    <p:sldId id="267" r:id="rId10"/>
+    <p:sldId id="268" r:id="rId11"/>
+    <p:sldId id="271" r:id="rId12"/>
+    <p:sldId id="269" r:id="rId13"/>
+    <p:sldId id="262" r:id="rId14"/>
   </p:sldIdLst>
   <p:sldSz cx="12192000" cy="6858000"/>
   <p:notesSz cx="6858000" cy="9144000"/>
@@ -115,6 +119,11 @@
       </a:defRPr>
     </a:lvl9pPr>
   </p:defaultTextStyle>
+  <p:extLst>
+    <p:ext uri="{EFAFB233-063F-42B5-8137-9DF3F51BA10A}">
+      <p15:sldGuideLst xmlns:p15="http://schemas.microsoft.com/office/powerpoint/2012/main"/>
+    </p:ext>
+  </p:extLst>
 </p:presentation>
 </file>
 
@@ -200,7 +209,7 @@
           <a:p>
             <a:fld id="{9060CDDE-06DE-4C5F-91D0-330B63526E60}" type="datetimeFigureOut">
               <a:rPr lang="es-MX" smtClean="0"/>
-              <a:t>21/10/2021</a:t>
+              <a:t>22/10/2021</a:t>
             </a:fld>
             <a:endParaRPr lang="es-MX"/>
           </a:p>
@@ -22486,7 +22495,7 @@
             <a:fld id="{B61BEF0D-F0BB-DE4B-95CE-6DB70DBA9567}" type="datetimeFigureOut">
               <a:rPr lang="en-US" smtClean="0"/>
               <a:pPr/>
-              <a:t>10/21/2021</a:t>
+              <a:t>10/22/2021</a:t>
             </a:fld>
             <a:endParaRPr lang="en-US" dirty="0"/>
           </a:p>
@@ -22719,7 +22728,7 @@
             <a:fld id="{B61BEF0D-F0BB-DE4B-95CE-6DB70DBA9567}" type="datetimeFigureOut">
               <a:rPr lang="en-US" smtClean="0"/>
               <a:pPr/>
-              <a:t>10/21/2021</a:t>
+              <a:t>10/22/2021</a:t>
             </a:fld>
             <a:endParaRPr lang="en-US" dirty="0"/>
           </a:p>
@@ -22957,7 +22966,7 @@
             <a:fld id="{B61BEF0D-F0BB-DE4B-95CE-6DB70DBA9567}" type="datetimeFigureOut">
               <a:rPr lang="en-US" smtClean="0"/>
               <a:pPr/>
-              <a:t>10/21/2021</a:t>
+              <a:t>10/22/2021</a:t>
             </a:fld>
             <a:endParaRPr lang="en-US" dirty="0"/>
           </a:p>
@@ -23287,7 +23296,7 @@
             <a:fld id="{B61BEF0D-F0BB-DE4B-95CE-6DB70DBA9567}" type="datetimeFigureOut">
               <a:rPr lang="en-US" smtClean="0"/>
               <a:pPr/>
-              <a:t>10/21/2021</a:t>
+              <a:t>10/22/2021</a:t>
             </a:fld>
             <a:endParaRPr lang="en-US" dirty="0"/>
           </a:p>
@@ -23541,7 +23550,7 @@
             <a:fld id="{B61BEF0D-F0BB-DE4B-95CE-6DB70DBA9567}" type="datetimeFigureOut">
               <a:rPr lang="en-US" smtClean="0"/>
               <a:pPr/>
-              <a:t>10/21/2021</a:t>
+              <a:t>10/22/2021</a:t>
             </a:fld>
             <a:endParaRPr lang="en-US" dirty="0"/>
           </a:p>
@@ -23851,7 +23860,7 @@
             <a:fld id="{B61BEF0D-F0BB-DE4B-95CE-6DB70DBA9567}" type="datetimeFigureOut">
               <a:rPr lang="en-US" smtClean="0"/>
               <a:pPr/>
-              <a:t>10/21/2021</a:t>
+              <a:t>10/22/2021</a:t>
             </a:fld>
             <a:endParaRPr lang="en-US" dirty="0"/>
           </a:p>
@@ -24156,7 +24165,7 @@
             <a:fld id="{B61BEF0D-F0BB-DE4B-95CE-6DB70DBA9567}" type="datetimeFigureOut">
               <a:rPr lang="en-US" smtClean="0"/>
               <a:pPr/>
-              <a:t>10/21/2021</a:t>
+              <a:t>10/22/2021</a:t>
             </a:fld>
             <a:endParaRPr lang="en-US" dirty="0"/>
           </a:p>
@@ -24581,7 +24590,7 @@
             <a:fld id="{B61BEF0D-F0BB-DE4B-95CE-6DB70DBA9567}" type="datetimeFigureOut">
               <a:rPr lang="en-US" smtClean="0"/>
               <a:pPr/>
-              <a:t>10/21/2021</a:t>
+              <a:t>10/22/2021</a:t>
             </a:fld>
             <a:endParaRPr lang="en-US" dirty="0"/>
           </a:p>
@@ -24746,7 +24755,7 @@
             <a:fld id="{B61BEF0D-F0BB-DE4B-95CE-6DB70DBA9567}" type="datetimeFigureOut">
               <a:rPr lang="en-US" smtClean="0"/>
               <a:pPr/>
-              <a:t>10/21/2021</a:t>
+              <a:t>10/22/2021</a:t>
             </a:fld>
             <a:endParaRPr lang="en-US" dirty="0"/>
           </a:p>
@@ -24844,7 +24853,7 @@
             <a:fld id="{B61BEF0D-F0BB-DE4B-95CE-6DB70DBA9567}" type="datetimeFigureOut">
               <a:rPr lang="en-US" smtClean="0"/>
               <a:pPr/>
-              <a:t>10/21/2021</a:t>
+              <a:t>10/22/2021</a:t>
             </a:fld>
             <a:endParaRPr lang="en-US" dirty="0"/>
           </a:p>
@@ -25225,7 +25234,7 @@
             <a:fld id="{B61BEF0D-F0BB-DE4B-95CE-6DB70DBA9567}" type="datetimeFigureOut">
               <a:rPr lang="en-US" smtClean="0"/>
               <a:pPr/>
-              <a:t>10/21/2021</a:t>
+              <a:t>10/22/2021</a:t>
             </a:fld>
             <a:endParaRPr lang="en-US" dirty="0"/>
           </a:p>
@@ -26675,7 +26684,7 @@
             <a:fld id="{B61BEF0D-F0BB-DE4B-95CE-6DB70DBA9567}" type="datetimeFigureOut">
               <a:rPr lang="en-US" smtClean="0"/>
               <a:pPr/>
-              <a:t>10/21/2021</a:t>
+              <a:t>10/22/2021</a:t>
             </a:fld>
             <a:endParaRPr lang="en-US" dirty="0"/>
           </a:p>
@@ -27313,7 +27322,7 @@
               <a:rPr lang="en" sz="4000" dirty="0">
                 <a:latin typeface="Bernard MT Condensed" panose="02050806060905020404" pitchFamily="18" charset="0"/>
               </a:rPr>
-              <a:t>Reconocimiento de Arañas con CNN</a:t>
+              <a:t>Clasificación de Arañas con CNN</a:t>
             </a:r>
           </a:p>
           <a:p>
@@ -27390,6 +27399,382 @@
     <p:extLst>
       <p:ext uri="{BB962C8B-B14F-4D97-AF65-F5344CB8AC3E}">
         <p14:creationId xmlns:p14="http://schemas.microsoft.com/office/powerpoint/2010/main" val="2453172857"/>
+      </p:ext>
+    </p:extLst>
+  </p:cSld>
+  <p:clrMapOvr>
+    <a:masterClrMapping/>
+  </p:clrMapOvr>
+</p:sld>
+</file>
+
+<file path=ppt/slides/slide10.xml><?xml version="1.0" encoding="utf-8"?>
+<p:sld xmlns:a="http://schemas.openxmlformats.org/drawingml/2006/main" xmlns:r="http://schemas.openxmlformats.org/officeDocument/2006/relationships" xmlns:p="http://schemas.openxmlformats.org/presentationml/2006/main">
+  <p:cSld>
+    <p:spTree>
+      <p:nvGrpSpPr>
+        <p:cNvPr id="1" name=""/>
+        <p:cNvGrpSpPr/>
+        <p:nvPr/>
+      </p:nvGrpSpPr>
+      <p:grpSpPr>
+        <a:xfrm>
+          <a:off x="0" y="0"/>
+          <a:ext cx="0" cy="0"/>
+          <a:chOff x="0" y="0"/>
+          <a:chExt cx="0" cy="0"/>
+        </a:xfrm>
+      </p:grpSpPr>
+      <p:sp>
+        <p:nvSpPr>
+          <p:cNvPr id="2" name="Título 1">
+            <a:extLst>
+              <a:ext uri="{FF2B5EF4-FFF2-40B4-BE49-F238E27FC236}">
+                <a16:creationId xmlns:a16="http://schemas.microsoft.com/office/drawing/2014/main" id="{329F2EC1-E379-4197-B2B5-6FEF18CCAAAD}"/>
+              </a:ext>
+            </a:extLst>
+          </p:cNvPr>
+          <p:cNvSpPr>
+            <a:spLocks noGrp="1"/>
+          </p:cNvSpPr>
+          <p:nvPr>
+            <p:ph type="title"/>
+          </p:nvPr>
+        </p:nvSpPr>
+        <p:spPr/>
+        <p:txBody>
+          <a:bodyPr/>
+          <a:lstStyle/>
+          <a:p>
+            <a:r>
+              <a:rPr lang="es-MX" dirty="0"/>
+              <a:t>Limitaciones del proyecto</a:t>
+            </a:r>
+          </a:p>
+        </p:txBody>
+      </p:sp>
+      <p:sp>
+        <p:nvSpPr>
+          <p:cNvPr id="3" name="Marcador de contenido 2">
+            <a:extLst>
+              <a:ext uri="{FF2B5EF4-FFF2-40B4-BE49-F238E27FC236}">
+                <a16:creationId xmlns:a16="http://schemas.microsoft.com/office/drawing/2014/main" id="{DBF11DAF-17A1-41C6-8DDD-D73A4D133682}"/>
+              </a:ext>
+            </a:extLst>
+          </p:cNvPr>
+          <p:cNvSpPr>
+            <a:spLocks noGrp="1"/>
+          </p:cNvSpPr>
+          <p:nvPr>
+            <p:ph idx="1"/>
+          </p:nvPr>
+        </p:nvSpPr>
+        <p:spPr/>
+        <p:txBody>
+          <a:bodyPr/>
+          <a:lstStyle/>
+          <a:p>
+            <a:r>
+              <a:rPr lang="es-MX" dirty="0"/>
+              <a:t>Las imágenes que observamos del </a:t>
+            </a:r>
+            <a:r>
+              <a:rPr lang="es-MX" dirty="0" err="1"/>
+              <a:t>dataset</a:t>
+            </a:r>
+            <a:r>
+              <a:rPr lang="es-MX" dirty="0"/>
+              <a:t> tienen muy buena calidad, lo que es bueno para nuestro modelo pero podría afectar si queremos clasificar una imagen de menos calidad en el futuro</a:t>
+            </a:r>
+          </a:p>
+          <a:p>
+            <a:r>
+              <a:rPr lang="es-MX" dirty="0"/>
+              <a:t>Hay más de 48,000 especies de arañas en el mundo, clasificar correctamente 15 especies no tendrá mucho impacto</a:t>
+            </a:r>
+          </a:p>
+          <a:p>
+            <a:endParaRPr lang="es-MX" dirty="0"/>
+          </a:p>
+        </p:txBody>
+      </p:sp>
+    </p:spTree>
+    <p:extLst>
+      <p:ext uri="{BB962C8B-B14F-4D97-AF65-F5344CB8AC3E}">
+        <p14:creationId xmlns:p14="http://schemas.microsoft.com/office/powerpoint/2010/main" val="3832084126"/>
+      </p:ext>
+    </p:extLst>
+  </p:cSld>
+  <p:clrMapOvr>
+    <a:masterClrMapping/>
+  </p:clrMapOvr>
+</p:sld>
+</file>
+
+<file path=ppt/slides/slide11.xml><?xml version="1.0" encoding="utf-8"?>
+<p:sld xmlns:a="http://schemas.openxmlformats.org/drawingml/2006/main" xmlns:r="http://schemas.openxmlformats.org/officeDocument/2006/relationships" xmlns:p="http://schemas.openxmlformats.org/presentationml/2006/main">
+  <p:cSld>
+    <p:spTree>
+      <p:nvGrpSpPr>
+        <p:cNvPr id="1" name=""/>
+        <p:cNvGrpSpPr/>
+        <p:nvPr/>
+      </p:nvGrpSpPr>
+      <p:grpSpPr>
+        <a:xfrm>
+          <a:off x="0" y="0"/>
+          <a:ext cx="0" cy="0"/>
+          <a:chOff x="0" y="0"/>
+          <a:chExt cx="0" cy="0"/>
+        </a:xfrm>
+      </p:grpSpPr>
+      <p:sp>
+        <p:nvSpPr>
+          <p:cNvPr id="2" name="Título 1">
+            <a:extLst>
+              <a:ext uri="{FF2B5EF4-FFF2-40B4-BE49-F238E27FC236}">
+                <a16:creationId xmlns:a16="http://schemas.microsoft.com/office/drawing/2014/main" id="{C4D5E1B3-1882-4610-977B-761319295704}"/>
+              </a:ext>
+            </a:extLst>
+          </p:cNvPr>
+          <p:cNvSpPr>
+            <a:spLocks noGrp="1"/>
+          </p:cNvSpPr>
+          <p:nvPr>
+            <p:ph type="title"/>
+          </p:nvPr>
+        </p:nvSpPr>
+        <p:spPr/>
+        <p:txBody>
+          <a:bodyPr/>
+          <a:lstStyle/>
+          <a:p>
+            <a:r>
+              <a:rPr lang="es-MX" dirty="0"/>
+              <a:t>Metas del proyecto</a:t>
+            </a:r>
+          </a:p>
+        </p:txBody>
+      </p:sp>
+      <p:sp>
+        <p:nvSpPr>
+          <p:cNvPr id="3" name="Marcador de contenido 2">
+            <a:extLst>
+              <a:ext uri="{FF2B5EF4-FFF2-40B4-BE49-F238E27FC236}">
+                <a16:creationId xmlns:a16="http://schemas.microsoft.com/office/drawing/2014/main" id="{7CF27B48-2750-44F4-B97C-3E16289CF3CE}"/>
+              </a:ext>
+            </a:extLst>
+          </p:cNvPr>
+          <p:cNvSpPr>
+            <a:spLocks noGrp="1"/>
+          </p:cNvSpPr>
+          <p:nvPr>
+            <p:ph idx="1"/>
+          </p:nvPr>
+        </p:nvSpPr>
+        <p:spPr/>
+        <p:txBody>
+          <a:bodyPr/>
+          <a:lstStyle/>
+          <a:p>
+            <a:r>
+              <a:rPr lang="es-MX" dirty="0"/>
+              <a:t>Comparar los resultados de los modelos de </a:t>
+            </a:r>
+            <a:r>
+              <a:rPr lang="es-MX" dirty="0" err="1"/>
+              <a:t>Xception</a:t>
+            </a:r>
+            <a:r>
+              <a:rPr lang="es-MX" dirty="0"/>
+              <a:t> y VGG-16 y comparar estos resultados con modelos ya aplicados al </a:t>
+            </a:r>
+            <a:r>
+              <a:rPr lang="es-MX" dirty="0" err="1"/>
+              <a:t>dataset</a:t>
+            </a:r>
+            <a:r>
+              <a:rPr lang="es-MX" dirty="0"/>
+              <a:t> </a:t>
+            </a:r>
+          </a:p>
+          <a:p>
+            <a:r>
+              <a:rPr lang="es-MX" dirty="0"/>
+              <a:t>Dependiendo del tiempo,  añadir un tipo de araña a nuestro </a:t>
+            </a:r>
+            <a:r>
+              <a:rPr lang="es-MX" dirty="0" err="1"/>
+              <a:t>dataset</a:t>
+            </a:r>
+            <a:r>
+              <a:rPr lang="es-MX" dirty="0"/>
+              <a:t> y ver cómo se comporta el modelo</a:t>
+            </a:r>
+          </a:p>
+          <a:p>
+            <a:r>
+              <a:rPr lang="es-MX" dirty="0"/>
+              <a:t>Dependiendo del tiempo, aplicar la técnica de transfer </a:t>
+            </a:r>
+            <a:r>
+              <a:rPr lang="es-MX" dirty="0" err="1"/>
+              <a:t>learning</a:t>
+            </a:r>
+            <a:r>
+              <a:rPr lang="es-MX" dirty="0"/>
+              <a:t> </a:t>
+            </a:r>
+          </a:p>
+        </p:txBody>
+      </p:sp>
+    </p:spTree>
+    <p:extLst>
+      <p:ext uri="{BB962C8B-B14F-4D97-AF65-F5344CB8AC3E}">
+        <p14:creationId xmlns:p14="http://schemas.microsoft.com/office/powerpoint/2010/main" val="3243464872"/>
+      </p:ext>
+    </p:extLst>
+  </p:cSld>
+  <p:clrMapOvr>
+    <a:masterClrMapping/>
+  </p:clrMapOvr>
+</p:sld>
+</file>
+
+<file path=ppt/slides/slide12.xml><?xml version="1.0" encoding="utf-8"?>
+<p:sld xmlns:a="http://schemas.openxmlformats.org/drawingml/2006/main" xmlns:r="http://schemas.openxmlformats.org/officeDocument/2006/relationships" xmlns:p="http://schemas.openxmlformats.org/presentationml/2006/main">
+  <p:cSld>
+    <p:spTree>
+      <p:nvGrpSpPr>
+        <p:cNvPr id="1" name=""/>
+        <p:cNvGrpSpPr/>
+        <p:nvPr/>
+      </p:nvGrpSpPr>
+      <p:grpSpPr>
+        <a:xfrm>
+          <a:off x="0" y="0"/>
+          <a:ext cx="0" cy="0"/>
+          <a:chOff x="0" y="0"/>
+          <a:chExt cx="0" cy="0"/>
+        </a:xfrm>
+      </p:grpSpPr>
+      <p:sp>
+        <p:nvSpPr>
+          <p:cNvPr id="2" name="Título 1">
+            <a:extLst>
+              <a:ext uri="{FF2B5EF4-FFF2-40B4-BE49-F238E27FC236}">
+                <a16:creationId xmlns:a16="http://schemas.microsoft.com/office/drawing/2014/main" id="{7D751ECC-10AA-4E1F-AFF5-118DB7EB4A2E}"/>
+              </a:ext>
+            </a:extLst>
+          </p:cNvPr>
+          <p:cNvSpPr>
+            <a:spLocks noGrp="1"/>
+          </p:cNvSpPr>
+          <p:nvPr>
+            <p:ph type="title"/>
+          </p:nvPr>
+        </p:nvSpPr>
+        <p:spPr/>
+        <p:txBody>
+          <a:bodyPr/>
+          <a:lstStyle/>
+          <a:p>
+            <a:r>
+              <a:rPr lang="es-MX" dirty="0"/>
+              <a:t>Bibliografía</a:t>
+            </a:r>
+          </a:p>
+        </p:txBody>
+      </p:sp>
+      <p:sp>
+        <p:nvSpPr>
+          <p:cNvPr id="3" name="Marcador de contenido 2">
+            <a:extLst>
+              <a:ext uri="{FF2B5EF4-FFF2-40B4-BE49-F238E27FC236}">
+                <a16:creationId xmlns:a16="http://schemas.microsoft.com/office/drawing/2014/main" id="{B1327A39-2827-450E-BB6E-36696A0FC4BC}"/>
+              </a:ext>
+            </a:extLst>
+          </p:cNvPr>
+          <p:cNvSpPr>
+            <a:spLocks noGrp="1"/>
+          </p:cNvSpPr>
+          <p:nvPr>
+            <p:ph idx="1"/>
+          </p:nvPr>
+        </p:nvSpPr>
+        <p:spPr/>
+        <p:txBody>
+          <a:bodyPr/>
+          <a:lstStyle/>
+          <a:p>
+            <a:r>
+              <a:rPr lang="en-US" sz="1800" i="1" dirty="0" err="1"/>
+              <a:t>Fusto</a:t>
+            </a:r>
+            <a:r>
+              <a:rPr lang="en-US" sz="1800" i="1" dirty="0"/>
+              <a:t>, G. (2020, October 2). Spider bites of medical significance in the Mediterranean area: misdiagnosis, clinical features and management. </a:t>
+            </a:r>
+            <a:r>
+              <a:rPr lang="en-US" sz="1800" i="1" dirty="0" err="1"/>
+              <a:t>SciELO</a:t>
+            </a:r>
+            <a:r>
+              <a:rPr lang="en-US" sz="1800" i="1" dirty="0"/>
+              <a:t> - Scientific Electronic Library Online. Retrieved October 20, 2021, from </a:t>
+            </a:r>
+            <a:r>
+              <a:rPr lang="en-US" sz="1800" i="1" dirty="0">
+                <a:hlinkClick r:id="rId2"/>
+              </a:rPr>
+              <a:t>https://www.scielo.br/j/jvatitd/a/wQrfMGpmjygxpVBGSsFDgRp/?lang=en</a:t>
+            </a:r>
+            <a:endParaRPr lang="en-US" i="1" dirty="0"/>
+          </a:p>
+          <a:p>
+            <a:r>
+              <a:rPr lang="en-US" sz="1800" i="1" dirty="0"/>
+              <a:t>Williams M, Anderson J, Nappe TM. Black Widow Spider Toxicity. [Updated 2021 Aug 11]. In: </a:t>
+            </a:r>
+            <a:r>
+              <a:rPr lang="en-US" sz="1800" i="1" dirty="0" err="1"/>
+              <a:t>StatPearls</a:t>
+            </a:r>
+            <a:r>
+              <a:rPr lang="en-US" sz="1800" i="1" dirty="0"/>
+              <a:t> [Internet]. Treasure Island (FL): </a:t>
+            </a:r>
+            <a:r>
+              <a:rPr lang="en-US" sz="1800" i="1" dirty="0" err="1"/>
+              <a:t>StatPearls</a:t>
+            </a:r>
+            <a:r>
+              <a:rPr lang="en-US" sz="1800" i="1" dirty="0"/>
+              <a:t> Publishing; 2021 Jan-. Available from: </a:t>
+            </a:r>
+            <a:r>
+              <a:rPr lang="en-US" sz="1800" i="1" dirty="0">
+                <a:hlinkClick r:id="rId3"/>
+              </a:rPr>
+              <a:t>https://www.ncbi.nlm.nih.gov/books/NBK499987/</a:t>
+            </a:r>
+            <a:endParaRPr lang="en-US" sz="1800" i="1" dirty="0"/>
+          </a:p>
+          <a:p>
+            <a:r>
+              <a:rPr lang="en-US" sz="1800" i="1" dirty="0"/>
+              <a:t>Sinnott, R. O., Yang, D., Ding, X., &amp; Ye, Z. (2020). Poisonous Spider Recognition through Deep Learning. Proceedings of the Australasian Computer Science Week Multiconference, 04(6), 1–6.</a:t>
+            </a:r>
+          </a:p>
+          <a:p>
+            <a:endParaRPr lang="es-MX" dirty="0"/>
+          </a:p>
+        </p:txBody>
+      </p:sp>
+    </p:spTree>
+    <p:extLst>
+      <p:ext uri="{BB962C8B-B14F-4D97-AF65-F5344CB8AC3E}">
+        <p14:creationId xmlns:p14="http://schemas.microsoft.com/office/powerpoint/2010/main" val="3682137547"/>
       </p:ext>
     </p:extLst>
   </p:cSld>
@@ -27480,7 +27865,7 @@
           <a:p>
             <a:r>
               <a:rPr lang="es-MX" b="1" dirty="0"/>
-              <a:t>¿Por qué es importante poder reconocer una araña? </a:t>
+              <a:t>¿Por qué es importante poder clasificar una araña? </a:t>
             </a:r>
           </a:p>
           <a:p>
@@ -27897,6 +28282,782 @@
           <p:cNvPr id="2" name="Título 1">
             <a:extLst>
               <a:ext uri="{FF2B5EF4-FFF2-40B4-BE49-F238E27FC236}">
+                <a16:creationId xmlns:a16="http://schemas.microsoft.com/office/drawing/2014/main" id="{1393F942-3E7B-48F5-802F-E62A0C5835EF}"/>
+              </a:ext>
+            </a:extLst>
+          </p:cNvPr>
+          <p:cNvSpPr>
+            <a:spLocks noGrp="1"/>
+          </p:cNvSpPr>
+          <p:nvPr>
+            <p:ph type="title"/>
+          </p:nvPr>
+        </p:nvSpPr>
+        <p:spPr/>
+        <p:txBody>
+          <a:bodyPr/>
+          <a:lstStyle/>
+          <a:p>
+            <a:endParaRPr lang="es-MX"/>
+          </a:p>
+        </p:txBody>
+      </p:sp>
+      <p:sp>
+        <p:nvSpPr>
+          <p:cNvPr id="3" name="Marcador de contenido 2">
+            <a:extLst>
+              <a:ext uri="{FF2B5EF4-FFF2-40B4-BE49-F238E27FC236}">
+                <a16:creationId xmlns:a16="http://schemas.microsoft.com/office/drawing/2014/main" id="{47570ADC-D969-4C2B-A72C-32A915E87462}"/>
+              </a:ext>
+            </a:extLst>
+          </p:cNvPr>
+          <p:cNvSpPr>
+            <a:spLocks noGrp="1"/>
+          </p:cNvSpPr>
+          <p:nvPr>
+            <p:ph idx="1"/>
+          </p:nvPr>
+        </p:nvSpPr>
+        <p:spPr/>
+        <p:txBody>
+          <a:bodyPr/>
+          <a:lstStyle/>
+          <a:p>
+            <a:pPr algn="l"/>
+            <a:r>
+              <a:rPr lang="es-MX" b="0" i="0" dirty="0">
+                <a:solidFill>
+                  <a:srgbClr val="333333"/>
+                </a:solidFill>
+                <a:effectLst/>
+                <a:latin typeface="Arial" panose="020B0604020202020204" pitchFamily="34" charset="0"/>
+              </a:rPr>
+              <a:t>Y. </a:t>
+            </a:r>
+            <a:r>
+              <a:rPr lang="es-MX" b="0" i="0" dirty="0" err="1">
+                <a:solidFill>
+                  <a:srgbClr val="333333"/>
+                </a:solidFill>
+                <a:effectLst/>
+                <a:latin typeface="Arial" panose="020B0604020202020204" pitchFamily="34" charset="0"/>
+              </a:rPr>
+              <a:t>Jian</a:t>
+            </a:r>
+            <a:r>
+              <a:rPr lang="es-MX" b="0" i="0" dirty="0">
+                <a:solidFill>
+                  <a:srgbClr val="333333"/>
+                </a:solidFill>
+                <a:effectLst/>
+                <a:latin typeface="Arial" panose="020B0604020202020204" pitchFamily="34" charset="0"/>
+              </a:rPr>
+              <a:t>, S. </a:t>
+            </a:r>
+            <a:r>
+              <a:rPr lang="es-MX" b="0" i="0" dirty="0" err="1">
+                <a:solidFill>
+                  <a:srgbClr val="333333"/>
+                </a:solidFill>
+                <a:effectLst/>
+                <a:latin typeface="Arial" panose="020B0604020202020204" pitchFamily="34" charset="0"/>
+              </a:rPr>
+              <a:t>Peng</a:t>
+            </a:r>
+            <a:r>
+              <a:rPr lang="es-MX" b="0" i="0" dirty="0">
+                <a:solidFill>
+                  <a:srgbClr val="333333"/>
+                </a:solidFill>
+                <a:effectLst/>
+                <a:latin typeface="Arial" panose="020B0604020202020204" pitchFamily="34" charset="0"/>
+              </a:rPr>
+              <a:t>, L. </a:t>
+            </a:r>
+            <a:r>
+              <a:rPr lang="es-MX" b="0" i="0" dirty="0" err="1">
+                <a:solidFill>
+                  <a:srgbClr val="333333"/>
+                </a:solidFill>
+                <a:effectLst/>
+                <a:latin typeface="Arial" panose="020B0604020202020204" pitchFamily="34" charset="0"/>
+              </a:rPr>
+              <a:t>Zhenpeng</a:t>
+            </a:r>
+            <a:r>
+              <a:rPr lang="es-MX" b="0" i="0" dirty="0">
+                <a:solidFill>
+                  <a:srgbClr val="333333"/>
+                </a:solidFill>
+                <a:effectLst/>
+                <a:latin typeface="Arial" panose="020B0604020202020204" pitchFamily="34" charset="0"/>
+              </a:rPr>
+              <a:t>, Z. </a:t>
+            </a:r>
+            <a:r>
+              <a:rPr lang="es-MX" b="0" i="0" dirty="0" err="1">
+                <a:solidFill>
+                  <a:srgbClr val="333333"/>
+                </a:solidFill>
+                <a:effectLst/>
+                <a:latin typeface="Arial" panose="020B0604020202020204" pitchFamily="34" charset="0"/>
+              </a:rPr>
+              <a:t>Yu</a:t>
+            </a:r>
+            <a:r>
+              <a:rPr lang="es-MX" b="0" i="0" dirty="0">
+                <a:solidFill>
+                  <a:srgbClr val="333333"/>
+                </a:solidFill>
+                <a:effectLst/>
+                <a:latin typeface="Arial" panose="020B0604020202020204" pitchFamily="34" charset="0"/>
+              </a:rPr>
+              <a:t>, Z. </a:t>
+            </a:r>
+            <a:r>
+              <a:rPr lang="es-MX" b="0" i="0" dirty="0" err="1">
+                <a:solidFill>
+                  <a:srgbClr val="333333"/>
+                </a:solidFill>
+                <a:effectLst/>
+                <a:latin typeface="Arial" panose="020B0604020202020204" pitchFamily="34" charset="0"/>
+              </a:rPr>
+              <a:t>Chenggui</a:t>
+            </a:r>
+            <a:r>
+              <a:rPr lang="es-MX" b="0" i="0" dirty="0">
+                <a:solidFill>
+                  <a:srgbClr val="333333"/>
+                </a:solidFill>
+                <a:effectLst/>
+                <a:latin typeface="Arial" panose="020B0604020202020204" pitchFamily="34" charset="0"/>
+              </a:rPr>
+              <a:t> and Y. </a:t>
+            </a:r>
+            <a:r>
+              <a:rPr lang="es-MX" b="0" i="0" dirty="0" err="1">
+                <a:solidFill>
+                  <a:srgbClr val="333333"/>
+                </a:solidFill>
+                <a:effectLst/>
+                <a:latin typeface="Arial" panose="020B0604020202020204" pitchFamily="34" charset="0"/>
+              </a:rPr>
+              <a:t>Zizhong</a:t>
+            </a:r>
+            <a:r>
+              <a:rPr lang="es-MX" b="0" i="0" dirty="0">
+                <a:solidFill>
+                  <a:srgbClr val="333333"/>
+                </a:solidFill>
+                <a:effectLst/>
+                <a:latin typeface="Arial" panose="020B0604020202020204" pitchFamily="34" charset="0"/>
+              </a:rPr>
+              <a:t>, "</a:t>
+            </a:r>
+            <a:r>
+              <a:rPr lang="es-MX" b="0" i="0" dirty="0" err="1">
+                <a:solidFill>
+                  <a:srgbClr val="333333"/>
+                </a:solidFill>
+                <a:effectLst/>
+                <a:latin typeface="Arial" panose="020B0604020202020204" pitchFamily="34" charset="0"/>
+              </a:rPr>
+              <a:t>Automatic</a:t>
+            </a:r>
+            <a:r>
+              <a:rPr lang="es-MX" b="0" i="0" dirty="0">
+                <a:solidFill>
+                  <a:srgbClr val="333333"/>
+                </a:solidFill>
+                <a:effectLst/>
+                <a:latin typeface="Arial" panose="020B0604020202020204" pitchFamily="34" charset="0"/>
+              </a:rPr>
+              <a:t> </a:t>
+            </a:r>
+            <a:r>
+              <a:rPr lang="es-MX" b="0" i="0" dirty="0" err="1">
+                <a:solidFill>
+                  <a:srgbClr val="333333"/>
+                </a:solidFill>
+                <a:effectLst/>
+                <a:latin typeface="Arial" panose="020B0604020202020204" pitchFamily="34" charset="0"/>
+              </a:rPr>
+              <a:t>Classification</a:t>
+            </a:r>
+            <a:r>
+              <a:rPr lang="es-MX" b="0" i="0" dirty="0">
+                <a:solidFill>
+                  <a:srgbClr val="333333"/>
+                </a:solidFill>
+                <a:effectLst/>
+                <a:latin typeface="Arial" panose="020B0604020202020204" pitchFamily="34" charset="0"/>
+              </a:rPr>
+              <a:t> </a:t>
+            </a:r>
+            <a:r>
+              <a:rPr lang="es-MX" b="0" i="0" dirty="0" err="1">
+                <a:solidFill>
+                  <a:srgbClr val="333333"/>
+                </a:solidFill>
+                <a:effectLst/>
+                <a:latin typeface="Arial" panose="020B0604020202020204" pitchFamily="34" charset="0"/>
+              </a:rPr>
+              <a:t>of</a:t>
+            </a:r>
+            <a:r>
+              <a:rPr lang="es-MX" b="0" i="0" dirty="0">
+                <a:solidFill>
+                  <a:srgbClr val="333333"/>
+                </a:solidFill>
+                <a:effectLst/>
+                <a:latin typeface="Arial" panose="020B0604020202020204" pitchFamily="34" charset="0"/>
+              </a:rPr>
+              <a:t> Spider </a:t>
+            </a:r>
+            <a:r>
+              <a:rPr lang="es-MX" b="0" i="0" dirty="0" err="1">
+                <a:solidFill>
+                  <a:srgbClr val="333333"/>
+                </a:solidFill>
+                <a:effectLst/>
+                <a:latin typeface="Arial" panose="020B0604020202020204" pitchFamily="34" charset="0"/>
+              </a:rPr>
+              <a:t>Images</a:t>
+            </a:r>
+            <a:r>
+              <a:rPr lang="es-MX" b="0" i="0" dirty="0">
+                <a:solidFill>
+                  <a:srgbClr val="333333"/>
+                </a:solidFill>
+                <a:effectLst/>
+                <a:latin typeface="Arial" panose="020B0604020202020204" pitchFamily="34" charset="0"/>
+              </a:rPr>
+              <a:t> in Natural </a:t>
+            </a:r>
+            <a:r>
+              <a:rPr lang="es-MX" b="0" i="0" dirty="0" err="1">
+                <a:solidFill>
+                  <a:srgbClr val="333333"/>
+                </a:solidFill>
+                <a:effectLst/>
+                <a:latin typeface="Arial" panose="020B0604020202020204" pitchFamily="34" charset="0"/>
+              </a:rPr>
+              <a:t>Background</a:t>
+            </a:r>
+            <a:r>
+              <a:rPr lang="es-MX" b="0" i="0" dirty="0">
+                <a:solidFill>
+                  <a:srgbClr val="333333"/>
+                </a:solidFill>
+                <a:effectLst/>
+                <a:latin typeface="Arial" panose="020B0604020202020204" pitchFamily="34" charset="0"/>
+              </a:rPr>
+              <a:t>," </a:t>
+            </a:r>
+            <a:r>
+              <a:rPr lang="es-MX" b="0" i="1" dirty="0">
+                <a:solidFill>
+                  <a:srgbClr val="333333"/>
+                </a:solidFill>
+                <a:effectLst/>
+                <a:latin typeface="Arial" panose="020B0604020202020204" pitchFamily="34" charset="0"/>
+              </a:rPr>
+              <a:t>2019 IEEE 4th International </a:t>
+            </a:r>
+            <a:r>
+              <a:rPr lang="es-MX" b="0" i="1" dirty="0" err="1">
+                <a:solidFill>
+                  <a:srgbClr val="333333"/>
+                </a:solidFill>
+                <a:effectLst/>
+                <a:latin typeface="Arial" panose="020B0604020202020204" pitchFamily="34" charset="0"/>
+              </a:rPr>
+              <a:t>Conference</a:t>
+            </a:r>
+            <a:r>
+              <a:rPr lang="es-MX" b="0" i="1" dirty="0">
+                <a:solidFill>
+                  <a:srgbClr val="333333"/>
+                </a:solidFill>
+                <a:effectLst/>
+                <a:latin typeface="Arial" panose="020B0604020202020204" pitchFamily="34" charset="0"/>
+              </a:rPr>
+              <a:t> </a:t>
+            </a:r>
+            <a:r>
+              <a:rPr lang="es-MX" b="0" i="1" dirty="0" err="1">
+                <a:solidFill>
+                  <a:srgbClr val="333333"/>
+                </a:solidFill>
+                <a:effectLst/>
+                <a:latin typeface="Arial" panose="020B0604020202020204" pitchFamily="34" charset="0"/>
+              </a:rPr>
+              <a:t>on</a:t>
+            </a:r>
+            <a:r>
+              <a:rPr lang="es-MX" b="0" i="1" dirty="0">
+                <a:solidFill>
+                  <a:srgbClr val="333333"/>
+                </a:solidFill>
+                <a:effectLst/>
+                <a:latin typeface="Arial" panose="020B0604020202020204" pitchFamily="34" charset="0"/>
+              </a:rPr>
+              <a:t> </a:t>
+            </a:r>
+            <a:r>
+              <a:rPr lang="es-MX" b="0" i="1" dirty="0" err="1">
+                <a:solidFill>
+                  <a:srgbClr val="333333"/>
+                </a:solidFill>
+                <a:effectLst/>
+                <a:latin typeface="Arial" panose="020B0604020202020204" pitchFamily="34" charset="0"/>
+              </a:rPr>
+              <a:t>Signal</a:t>
+            </a:r>
+            <a:r>
+              <a:rPr lang="es-MX" b="0" i="1" dirty="0">
+                <a:solidFill>
+                  <a:srgbClr val="333333"/>
+                </a:solidFill>
+                <a:effectLst/>
+                <a:latin typeface="Arial" panose="020B0604020202020204" pitchFamily="34" charset="0"/>
+              </a:rPr>
+              <a:t> and </a:t>
+            </a:r>
+            <a:r>
+              <a:rPr lang="es-MX" b="0" i="1" dirty="0" err="1">
+                <a:solidFill>
+                  <a:srgbClr val="333333"/>
+                </a:solidFill>
+                <a:effectLst/>
+                <a:latin typeface="Arial" panose="020B0604020202020204" pitchFamily="34" charset="0"/>
+              </a:rPr>
+              <a:t>Image</a:t>
+            </a:r>
+            <a:r>
+              <a:rPr lang="es-MX" b="0" i="1" dirty="0">
+                <a:solidFill>
+                  <a:srgbClr val="333333"/>
+                </a:solidFill>
+                <a:effectLst/>
+                <a:latin typeface="Arial" panose="020B0604020202020204" pitchFamily="34" charset="0"/>
+              </a:rPr>
+              <a:t> Processing (ICSIP)</a:t>
+            </a:r>
+            <a:r>
+              <a:rPr lang="es-MX" b="0" i="0" dirty="0">
+                <a:solidFill>
+                  <a:srgbClr val="333333"/>
+                </a:solidFill>
+                <a:effectLst/>
+                <a:latin typeface="Arial" panose="020B0604020202020204" pitchFamily="34" charset="0"/>
+              </a:rPr>
+              <a:t>, 2019, pp. 158-164, </a:t>
+            </a:r>
+            <a:r>
+              <a:rPr lang="es-MX" b="0" i="0" dirty="0" err="1">
+                <a:solidFill>
+                  <a:srgbClr val="333333"/>
+                </a:solidFill>
+                <a:effectLst/>
+                <a:latin typeface="Arial" panose="020B0604020202020204" pitchFamily="34" charset="0"/>
+              </a:rPr>
+              <a:t>doi</a:t>
+            </a:r>
+            <a:r>
+              <a:rPr lang="es-MX" b="0" i="0" dirty="0">
+                <a:solidFill>
+                  <a:srgbClr val="333333"/>
+                </a:solidFill>
+                <a:effectLst/>
+                <a:latin typeface="Arial" panose="020B0604020202020204" pitchFamily="34" charset="0"/>
+              </a:rPr>
+              <a:t>: 10.1109/SIPROCESS.2019.8868601.</a:t>
+            </a:r>
+          </a:p>
+          <a:p>
+            <a:pPr lvl="1"/>
+            <a:r>
+              <a:rPr lang="es-MX" dirty="0" err="1">
+                <a:solidFill>
+                  <a:srgbClr val="333333"/>
+                </a:solidFill>
+                <a:latin typeface="Arial" panose="020B0604020202020204" pitchFamily="34" charset="0"/>
+              </a:rPr>
+              <a:t>Enhancement</a:t>
+            </a:r>
+            <a:r>
+              <a:rPr lang="es-MX" dirty="0">
+                <a:solidFill>
+                  <a:srgbClr val="333333"/>
+                </a:solidFill>
+                <a:latin typeface="Arial" panose="020B0604020202020204" pitchFamily="34" charset="0"/>
+              </a:rPr>
+              <a:t> </a:t>
+            </a:r>
+            <a:r>
+              <a:rPr lang="es-MX" dirty="0" err="1">
+                <a:solidFill>
+                  <a:srgbClr val="333333"/>
+                </a:solidFill>
+                <a:latin typeface="Arial" panose="020B0604020202020204" pitchFamily="34" charset="0"/>
+              </a:rPr>
+              <a:t>of</a:t>
+            </a:r>
+            <a:r>
+              <a:rPr lang="es-MX" dirty="0">
+                <a:solidFill>
+                  <a:srgbClr val="333333"/>
+                </a:solidFill>
+                <a:latin typeface="Arial" panose="020B0604020202020204" pitchFamily="34" charset="0"/>
+              </a:rPr>
+              <a:t> </a:t>
+            </a:r>
+            <a:r>
+              <a:rPr lang="es-MX" dirty="0" err="1">
+                <a:solidFill>
+                  <a:srgbClr val="333333"/>
+                </a:solidFill>
+                <a:latin typeface="Arial" panose="020B0604020202020204" pitchFamily="34" charset="0"/>
+              </a:rPr>
+              <a:t>the</a:t>
+            </a:r>
+            <a:r>
+              <a:rPr lang="es-MX" dirty="0">
+                <a:solidFill>
+                  <a:srgbClr val="333333"/>
+                </a:solidFill>
+                <a:latin typeface="Arial" panose="020B0604020202020204" pitchFamily="34" charset="0"/>
+              </a:rPr>
+              <a:t> </a:t>
+            </a:r>
+            <a:r>
+              <a:rPr lang="es-MX" dirty="0" err="1">
+                <a:solidFill>
+                  <a:srgbClr val="333333"/>
+                </a:solidFill>
+                <a:latin typeface="Arial" panose="020B0604020202020204" pitchFamily="34" charset="0"/>
+              </a:rPr>
+              <a:t>images</a:t>
+            </a:r>
+            <a:r>
+              <a:rPr lang="es-MX" dirty="0">
+                <a:solidFill>
+                  <a:srgbClr val="333333"/>
+                </a:solidFill>
+                <a:latin typeface="Arial" panose="020B0604020202020204" pitchFamily="34" charset="0"/>
+              </a:rPr>
+              <a:t> + </a:t>
+            </a:r>
+            <a:r>
+              <a:rPr lang="es-MX" dirty="0" err="1">
+                <a:solidFill>
+                  <a:srgbClr val="333333"/>
+                </a:solidFill>
+                <a:latin typeface="Arial" panose="020B0604020202020204" pitchFamily="34" charset="0"/>
+              </a:rPr>
+              <a:t>expanded</a:t>
+            </a:r>
+            <a:r>
+              <a:rPr lang="es-MX" dirty="0">
+                <a:solidFill>
+                  <a:srgbClr val="333333"/>
+                </a:solidFill>
+                <a:latin typeface="Arial" panose="020B0604020202020204" pitchFamily="34" charset="0"/>
+              </a:rPr>
+              <a:t> </a:t>
+            </a:r>
+            <a:r>
+              <a:rPr lang="es-MX" dirty="0" err="1">
+                <a:solidFill>
+                  <a:srgbClr val="333333"/>
+                </a:solidFill>
+                <a:latin typeface="Arial" panose="020B0604020202020204" pitchFamily="34" charset="0"/>
+              </a:rPr>
+              <a:t>dataset</a:t>
+            </a:r>
+            <a:r>
+              <a:rPr lang="es-MX" dirty="0">
+                <a:solidFill>
+                  <a:srgbClr val="333333"/>
+                </a:solidFill>
+                <a:latin typeface="Arial" panose="020B0604020202020204" pitchFamily="34" charset="0"/>
+              </a:rPr>
+              <a:t> </a:t>
+            </a:r>
+            <a:br>
+              <a:rPr lang="es-MX" dirty="0"/>
+            </a:br>
+            <a:endParaRPr lang="es-MX" dirty="0"/>
+          </a:p>
+          <a:p>
+            <a:endParaRPr lang="es-MX" dirty="0"/>
+          </a:p>
+          <a:p>
+            <a:endParaRPr lang="es-MX" dirty="0"/>
+          </a:p>
+          <a:p>
+            <a:endParaRPr lang="es-MX" dirty="0"/>
+          </a:p>
+          <a:p>
+            <a:endParaRPr lang="es-MX" dirty="0"/>
+          </a:p>
+          <a:p>
+            <a:endParaRPr lang="es-MX" dirty="0"/>
+          </a:p>
+        </p:txBody>
+      </p:sp>
+      <p:pic>
+        <p:nvPicPr>
+          <p:cNvPr id="5" name="Imagen 4">
+            <a:extLst>
+              <a:ext uri="{FF2B5EF4-FFF2-40B4-BE49-F238E27FC236}">
+                <a16:creationId xmlns:a16="http://schemas.microsoft.com/office/drawing/2014/main" id="{052AF753-9803-4E32-8DA0-53DC99D503E9}"/>
+              </a:ext>
+            </a:extLst>
+          </p:cNvPr>
+          <p:cNvPicPr>
+            <a:picLocks noChangeAspect="1"/>
+          </p:cNvPicPr>
+          <p:nvPr/>
+        </p:nvPicPr>
+        <p:blipFill>
+          <a:blip r:embed="rId2"/>
+          <a:stretch>
+            <a:fillRect/>
+          </a:stretch>
+        </p:blipFill>
+        <p:spPr>
+          <a:xfrm>
+            <a:off x="6133356" y="3429000"/>
+            <a:ext cx="4174980" cy="3253549"/>
+          </a:xfrm>
+          <a:prstGeom prst="rect">
+            <a:avLst/>
+          </a:prstGeom>
+        </p:spPr>
+      </p:pic>
+      <p:pic>
+        <p:nvPicPr>
+          <p:cNvPr id="7" name="Imagen 6">
+            <a:extLst>
+              <a:ext uri="{FF2B5EF4-FFF2-40B4-BE49-F238E27FC236}">
+                <a16:creationId xmlns:a16="http://schemas.microsoft.com/office/drawing/2014/main" id="{4DBB1958-D2E5-4F1D-AC7E-F3F0F70B7F03}"/>
+              </a:ext>
+            </a:extLst>
+          </p:cNvPr>
+          <p:cNvPicPr>
+            <a:picLocks noChangeAspect="1"/>
+          </p:cNvPicPr>
+          <p:nvPr/>
+        </p:nvPicPr>
+        <p:blipFill>
+          <a:blip r:embed="rId3"/>
+          <a:stretch>
+            <a:fillRect/>
+          </a:stretch>
+        </p:blipFill>
+        <p:spPr>
+          <a:xfrm>
+            <a:off x="2072640" y="3543680"/>
+            <a:ext cx="3429000" cy="3024188"/>
+          </a:xfrm>
+          <a:prstGeom prst="rect">
+            <a:avLst/>
+          </a:prstGeom>
+        </p:spPr>
+      </p:pic>
+    </p:spTree>
+    <p:extLst>
+      <p:ext uri="{BB962C8B-B14F-4D97-AF65-F5344CB8AC3E}">
+        <p14:creationId xmlns:p14="http://schemas.microsoft.com/office/powerpoint/2010/main" val="3245139393"/>
+      </p:ext>
+    </p:extLst>
+  </p:cSld>
+  <p:clrMapOvr>
+    <a:masterClrMapping/>
+  </p:clrMapOvr>
+</p:sld>
+</file>
+
+<file path=ppt/slides/slide7.xml><?xml version="1.0" encoding="utf-8"?>
+<p:sld xmlns:a="http://schemas.openxmlformats.org/drawingml/2006/main" xmlns:r="http://schemas.openxmlformats.org/officeDocument/2006/relationships" xmlns:p="http://schemas.openxmlformats.org/presentationml/2006/main">
+  <p:cSld>
+    <p:spTree>
+      <p:nvGrpSpPr>
+        <p:cNvPr id="1" name=""/>
+        <p:cNvGrpSpPr/>
+        <p:nvPr/>
+      </p:nvGrpSpPr>
+      <p:grpSpPr>
+        <a:xfrm>
+          <a:off x="0" y="0"/>
+          <a:ext cx="0" cy="0"/>
+          <a:chOff x="0" y="0"/>
+          <a:chExt cx="0" cy="0"/>
+        </a:xfrm>
+      </p:grpSpPr>
+      <p:pic>
+        <p:nvPicPr>
+          <p:cNvPr id="6" name="Imagen 5">
+            <a:extLst>
+              <a:ext uri="{FF2B5EF4-FFF2-40B4-BE49-F238E27FC236}">
+                <a16:creationId xmlns:a16="http://schemas.microsoft.com/office/drawing/2014/main" id="{6747566E-5629-4320-8957-9488651456D1}"/>
+              </a:ext>
+            </a:extLst>
+          </p:cNvPr>
+          <p:cNvPicPr>
+            <a:picLocks noChangeAspect="1"/>
+          </p:cNvPicPr>
+          <p:nvPr/>
+        </p:nvPicPr>
+        <p:blipFill>
+          <a:blip r:embed="rId2"/>
+          <a:stretch>
+            <a:fillRect/>
+          </a:stretch>
+        </p:blipFill>
+        <p:spPr>
+          <a:xfrm>
+            <a:off x="463486" y="1272349"/>
+            <a:ext cx="4791075" cy="5191125"/>
+          </a:xfrm>
+          <a:prstGeom prst="rect">
+            <a:avLst/>
+          </a:prstGeom>
+        </p:spPr>
+      </p:pic>
+      <p:sp>
+        <p:nvSpPr>
+          <p:cNvPr id="8" name="CuadroTexto 7">
+            <a:extLst>
+              <a:ext uri="{FF2B5EF4-FFF2-40B4-BE49-F238E27FC236}">
+                <a16:creationId xmlns:a16="http://schemas.microsoft.com/office/drawing/2014/main" id="{17546B22-DFF8-4DC4-86B3-1105EDC2878C}"/>
+              </a:ext>
+            </a:extLst>
+          </p:cNvPr>
+          <p:cNvSpPr txBox="1"/>
+          <p:nvPr/>
+        </p:nvSpPr>
+        <p:spPr>
+          <a:xfrm>
+            <a:off x="463486" y="626018"/>
+            <a:ext cx="6099048" cy="646331"/>
+          </a:xfrm>
+          <a:prstGeom prst="rect">
+            <a:avLst/>
+          </a:prstGeom>
+          <a:noFill/>
+        </p:spPr>
+        <p:txBody>
+          <a:bodyPr wrap="square">
+            <a:spAutoFit/>
+          </a:bodyPr>
+          <a:lstStyle/>
+          <a:p>
+            <a:r>
+              <a:rPr lang="en-US" i="1" dirty="0"/>
+              <a:t>the average accuracy of the model after 5000 training steps was 72%, while after 10000 steps it reached 68%</a:t>
+            </a:r>
+            <a:endParaRPr lang="es-MX" i="1" dirty="0"/>
+          </a:p>
+        </p:txBody>
+      </p:sp>
+      <p:pic>
+        <p:nvPicPr>
+          <p:cNvPr id="10" name="Imagen 9">
+            <a:extLst>
+              <a:ext uri="{FF2B5EF4-FFF2-40B4-BE49-F238E27FC236}">
+                <a16:creationId xmlns:a16="http://schemas.microsoft.com/office/drawing/2014/main" id="{CDF1850E-6F44-4B08-BD17-B7B6E7B0E75D}"/>
+              </a:ext>
+            </a:extLst>
+          </p:cNvPr>
+          <p:cNvPicPr>
+            <a:picLocks noChangeAspect="1"/>
+          </p:cNvPicPr>
+          <p:nvPr/>
+        </p:nvPicPr>
+        <p:blipFill>
+          <a:blip r:embed="rId3"/>
+          <a:stretch>
+            <a:fillRect/>
+          </a:stretch>
+        </p:blipFill>
+        <p:spPr>
+          <a:xfrm>
+            <a:off x="6102289" y="815149"/>
+            <a:ext cx="5419725" cy="3362325"/>
+          </a:xfrm>
+          <a:prstGeom prst="rect">
+            <a:avLst/>
+          </a:prstGeom>
+        </p:spPr>
+      </p:pic>
+      <p:pic>
+        <p:nvPicPr>
+          <p:cNvPr id="12" name="Imagen 11">
+            <a:extLst>
+              <a:ext uri="{FF2B5EF4-FFF2-40B4-BE49-F238E27FC236}">
+                <a16:creationId xmlns:a16="http://schemas.microsoft.com/office/drawing/2014/main" id="{C8D4E33D-7800-4411-A6EB-53C95CCE05E3}"/>
+              </a:ext>
+            </a:extLst>
+          </p:cNvPr>
+          <p:cNvPicPr>
+            <a:picLocks noChangeAspect="1"/>
+          </p:cNvPicPr>
+          <p:nvPr/>
+        </p:nvPicPr>
+        <p:blipFill>
+          <a:blip r:embed="rId4"/>
+          <a:stretch>
+            <a:fillRect/>
+          </a:stretch>
+        </p:blipFill>
+        <p:spPr>
+          <a:xfrm>
+            <a:off x="7010400" y="4231906"/>
+            <a:ext cx="4024312" cy="2626094"/>
+          </a:xfrm>
+          <a:prstGeom prst="rect">
+            <a:avLst/>
+          </a:prstGeom>
+        </p:spPr>
+      </p:pic>
+    </p:spTree>
+    <p:extLst>
+      <p:ext uri="{BB962C8B-B14F-4D97-AF65-F5344CB8AC3E}">
+        <p14:creationId xmlns:p14="http://schemas.microsoft.com/office/powerpoint/2010/main" val="3485276896"/>
+      </p:ext>
+    </p:extLst>
+  </p:cSld>
+  <p:clrMapOvr>
+    <a:masterClrMapping/>
+  </p:clrMapOvr>
+</p:sld>
+</file>
+
+<file path=ppt/slides/slide8.xml><?xml version="1.0" encoding="utf-8"?>
+<p:sld xmlns:a="http://schemas.openxmlformats.org/drawingml/2006/main" xmlns:r="http://schemas.openxmlformats.org/officeDocument/2006/relationships" xmlns:p="http://schemas.openxmlformats.org/presentationml/2006/main">
+  <p:cSld>
+    <p:spTree>
+      <p:nvGrpSpPr>
+        <p:cNvPr id="1" name=""/>
+        <p:cNvGrpSpPr/>
+        <p:nvPr/>
+      </p:nvGrpSpPr>
+      <p:grpSpPr>
+        <a:xfrm>
+          <a:off x="0" y="0"/>
+          <a:ext cx="0" cy="0"/>
+          <a:chOff x="0" y="0"/>
+          <a:chExt cx="0" cy="0"/>
+        </a:xfrm>
+      </p:grpSpPr>
+      <p:sp>
+        <p:nvSpPr>
+          <p:cNvPr id="2" name="Título 1">
+            <a:extLst>
+              <a:ext uri="{FF2B5EF4-FFF2-40B4-BE49-F238E27FC236}">
                 <a16:creationId xmlns:a16="http://schemas.microsoft.com/office/drawing/2014/main" id="{4FF1C6D7-D2E5-45A9-938C-0DB2B7544D22}"/>
               </a:ext>
             </a:extLst>
@@ -27920,6 +29081,200 @@
           </a:p>
         </p:txBody>
       </p:sp>
+      <p:sp>
+        <p:nvSpPr>
+          <p:cNvPr id="4" name="Marcador de contenido 3">
+            <a:extLst>
+              <a:ext uri="{FF2B5EF4-FFF2-40B4-BE49-F238E27FC236}">
+                <a16:creationId xmlns:a16="http://schemas.microsoft.com/office/drawing/2014/main" id="{B2149F3B-BBE4-4D40-B1E7-362FA05F4389}"/>
+              </a:ext>
+            </a:extLst>
+          </p:cNvPr>
+          <p:cNvSpPr>
+            <a:spLocks noGrp="1"/>
+          </p:cNvSpPr>
+          <p:nvPr>
+            <p:ph sz="half" idx="2"/>
+          </p:nvPr>
+        </p:nvSpPr>
+        <p:spPr/>
+        <p:txBody>
+          <a:bodyPr/>
+          <a:lstStyle/>
+          <a:p>
+            <a:r>
+              <a:rPr lang="es-MX" dirty="0" err="1"/>
+              <a:t>Xception</a:t>
+            </a:r>
+            <a:endParaRPr lang="es-MX" dirty="0"/>
+          </a:p>
+          <a:p>
+            <a:endParaRPr lang="es-MX" dirty="0"/>
+          </a:p>
+          <a:p>
+            <a:endParaRPr lang="es-MX" dirty="0"/>
+          </a:p>
+          <a:p>
+            <a:endParaRPr lang="es-MX" dirty="0"/>
+          </a:p>
+          <a:p>
+            <a:endParaRPr lang="es-MX" dirty="0"/>
+          </a:p>
+          <a:p>
+            <a:endParaRPr lang="es-MX" dirty="0"/>
+          </a:p>
+          <a:p>
+            <a:endParaRPr lang="es-MX" dirty="0"/>
+          </a:p>
+          <a:p>
+            <a:endParaRPr lang="es-MX" dirty="0"/>
+          </a:p>
+          <a:p>
+            <a:endParaRPr lang="es-MX" dirty="0"/>
+          </a:p>
+        </p:txBody>
+      </p:sp>
+      <p:sp>
+        <p:nvSpPr>
+          <p:cNvPr id="7" name="AutoShape 6">
+            <a:extLst>
+              <a:ext uri="{FF2B5EF4-FFF2-40B4-BE49-F238E27FC236}">
+                <a16:creationId xmlns:a16="http://schemas.microsoft.com/office/drawing/2014/main" id="{E3F17542-3588-4E59-A08B-0C5195E6ED61}"/>
+              </a:ext>
+            </a:extLst>
+          </p:cNvPr>
+          <p:cNvSpPr>
+            <a:spLocks noGrp="1" noChangeAspect="1" noChangeArrowheads="1"/>
+          </p:cNvSpPr>
+          <p:nvPr>
+            <p:ph sz="half" idx="1"/>
+          </p:nvPr>
+        </p:nvSpPr>
+        <p:spPr bwMode="auto">
+          <a:prstGeom prst="rect">
+            <a:avLst/>
+          </a:prstGeom>
+          <a:noFill/>
+          <a:extLst>
+            <a:ext uri="{909E8E84-426E-40DD-AFC4-6F175D3DCCD1}">
+              <a14:hiddenFill xmlns:a14="http://schemas.microsoft.com/office/drawing/2010/main">
+                <a:solidFill>
+                  <a:srgbClr val="FFFFFF"/>
+                </a:solidFill>
+              </a14:hiddenFill>
+            </a:ext>
+          </a:extLst>
+        </p:spPr>
+        <p:txBody>
+          <a:bodyPr vert="horz" wrap="square" lIns="91440" tIns="45720" rIns="91440" bIns="45720" numCol="1" anchor="t" anchorCtr="0" compatLnSpc="1">
+            <a:prstTxWarp prst="textNoShape">
+              <a:avLst/>
+            </a:prstTxWarp>
+          </a:bodyPr>
+          <a:lstStyle/>
+          <a:p>
+            <a:r>
+              <a:rPr lang="en-US" dirty="0"/>
+              <a:t>Very Deep Convolutional Networks for Large-Scale Image Recognition</a:t>
+            </a:r>
+            <a:endParaRPr lang="es-MX" dirty="0"/>
+          </a:p>
+        </p:txBody>
+      </p:sp>
+      <p:pic>
+        <p:nvPicPr>
+          <p:cNvPr id="1034" name="Picture 10">
+            <a:extLst>
+              <a:ext uri="{FF2B5EF4-FFF2-40B4-BE49-F238E27FC236}">
+                <a16:creationId xmlns:a16="http://schemas.microsoft.com/office/drawing/2014/main" id="{05A1569F-070B-4D01-8C37-611F22481ADC}"/>
+              </a:ext>
+            </a:extLst>
+          </p:cNvPr>
+          <p:cNvPicPr>
+            <a:picLocks noChangeAspect="1" noChangeArrowheads="1"/>
+          </p:cNvPicPr>
+          <p:nvPr/>
+        </p:nvPicPr>
+        <p:blipFill>
+          <a:blip r:embed="rId2">
+            <a:extLst>
+              <a:ext uri="{28A0092B-C50C-407E-A947-70E740481C1C}">
+                <a14:useLocalDpi xmlns:a14="http://schemas.microsoft.com/office/drawing/2010/main" val="0"/>
+              </a:ext>
+            </a:extLst>
+          </a:blip>
+          <a:srcRect/>
+          <a:stretch>
+            <a:fillRect/>
+          </a:stretch>
+        </p:blipFill>
+        <p:spPr bwMode="auto">
+          <a:xfrm>
+            <a:off x="396359" y="3166223"/>
+            <a:ext cx="5442538" cy="3204840"/>
+          </a:xfrm>
+          <a:prstGeom prst="rect">
+            <a:avLst/>
+          </a:prstGeom>
+          <a:noFill/>
+          <a:extLst>
+            <a:ext uri="{909E8E84-426E-40DD-AFC4-6F175D3DCCD1}">
+              <a14:hiddenFill xmlns:a14="http://schemas.microsoft.com/office/drawing/2010/main">
+                <a:solidFill>
+                  <a:srgbClr val="FFFFFF"/>
+                </a:solidFill>
+              </a14:hiddenFill>
+            </a:ext>
+          </a:extLst>
+        </p:spPr>
+      </p:pic>
+      <p:pic>
+        <p:nvPicPr>
+          <p:cNvPr id="1038" name="Picture 14" descr="Screen-Shot-2021-03-01-at-10.03.27-AM">
+            <a:extLst>
+              <a:ext uri="{FF2B5EF4-FFF2-40B4-BE49-F238E27FC236}">
+                <a16:creationId xmlns:a16="http://schemas.microsoft.com/office/drawing/2014/main" id="{4DADC47A-B693-4DF4-8786-4829383A9124}"/>
+              </a:ext>
+            </a:extLst>
+          </p:cNvPr>
+          <p:cNvPicPr>
+            <a:picLocks noChangeAspect="1" noChangeArrowheads="1"/>
+          </p:cNvPicPr>
+          <p:nvPr/>
+        </p:nvPicPr>
+        <p:blipFill>
+          <a:blip r:embed="rId3">
+            <a:extLst>
+              <a:ext uri="{28A0092B-C50C-407E-A947-70E740481C1C}">
+                <a14:useLocalDpi xmlns:a14="http://schemas.microsoft.com/office/drawing/2010/main" val="0"/>
+              </a:ext>
+            </a:extLst>
+          </a:blip>
+          <a:srcRect/>
+          <a:stretch>
+            <a:fillRect/>
+          </a:stretch>
+        </p:blipFill>
+        <p:spPr bwMode="auto">
+          <a:xfrm>
+            <a:off x="5762394" y="2860968"/>
+            <a:ext cx="6274437" cy="3658385"/>
+          </a:xfrm>
+          <a:prstGeom prst="rect">
+            <a:avLst/>
+          </a:prstGeom>
+          <a:noFill/>
+          <a:extLst>
+            <a:ext uri="{909E8E84-426E-40DD-AFC4-6F175D3DCCD1}">
+              <a14:hiddenFill xmlns:a14="http://schemas.microsoft.com/office/drawing/2010/main">
+                <a:solidFill>
+                  <a:srgbClr val="FFFFFF"/>
+                </a:solidFill>
+              </a14:hiddenFill>
+            </a:ext>
+          </a:extLst>
+        </p:spPr>
+      </p:pic>
     </p:spTree>
     <p:extLst>
       <p:ext uri="{BB962C8B-B14F-4D97-AF65-F5344CB8AC3E}">
@@ -27933,7 +29288,7 @@
 </p:sld>
 </file>
 
-<file path=ppt/slides/slide7.xml><?xml version="1.0" encoding="utf-8"?>
+<file path=ppt/slides/slide9.xml><?xml version="1.0" encoding="utf-8"?>
 <p:sld xmlns:a="http://schemas.openxmlformats.org/drawingml/2006/main" xmlns:r="http://schemas.openxmlformats.org/officeDocument/2006/relationships" xmlns:p="http://schemas.openxmlformats.org/presentationml/2006/main">
   <p:cSld>
     <p:spTree>
@@ -27978,252 +29333,55 @@
           </a:p>
         </p:txBody>
       </p:sp>
-      <p:sp>
-        <p:nvSpPr>
-          <p:cNvPr id="3" name="Marcador de contenido 2">
+      <p:pic>
+        <p:nvPicPr>
+          <p:cNvPr id="2050" name="Picture 2">
             <a:extLst>
               <a:ext uri="{FF2B5EF4-FFF2-40B4-BE49-F238E27FC236}">
-                <a16:creationId xmlns:a16="http://schemas.microsoft.com/office/drawing/2014/main" id="{FC8699B4-B808-4256-8DD2-EFDC641A52AF}"/>
+                <a16:creationId xmlns:a16="http://schemas.microsoft.com/office/drawing/2014/main" id="{F95A4429-012F-4D01-B7B4-D2F402404E18}"/>
               </a:ext>
             </a:extLst>
           </p:cNvPr>
-          <p:cNvSpPr>
-            <a:spLocks noGrp="1"/>
-          </p:cNvSpPr>
-          <p:nvPr>
-            <p:ph idx="1"/>
-          </p:nvPr>
-        </p:nvSpPr>
-        <p:spPr/>
-        <p:txBody>
-          <a:bodyPr/>
-          <a:lstStyle/>
-          <a:p>
-            <a:r>
-              <a:rPr lang="es-MX" dirty="0"/>
-              <a:t>Data </a:t>
-            </a:r>
-            <a:r>
-              <a:rPr lang="es-MX" dirty="0" err="1"/>
-              <a:t>Exploration</a:t>
-            </a:r>
-            <a:endParaRPr lang="es-MX" dirty="0"/>
-          </a:p>
-          <a:p>
-            <a:r>
-              <a:rPr lang="es-MX" dirty="0" err="1"/>
-              <a:t>Literature</a:t>
-            </a:r>
-            <a:r>
-              <a:rPr lang="es-MX" dirty="0"/>
-              <a:t> </a:t>
-            </a:r>
-            <a:r>
-              <a:rPr lang="es-MX" dirty="0" err="1"/>
-              <a:t>review</a:t>
-            </a:r>
-            <a:r>
-              <a:rPr lang="es-MX" dirty="0"/>
-              <a:t> </a:t>
-            </a:r>
-          </a:p>
-          <a:p>
-            <a:r>
-              <a:rPr lang="es-MX" dirty="0" err="1"/>
-              <a:t>Apply</a:t>
-            </a:r>
-            <a:r>
-              <a:rPr lang="es-MX" dirty="0"/>
-              <a:t> </a:t>
-            </a:r>
-            <a:r>
-              <a:rPr lang="es-MX" dirty="0" err="1"/>
-              <a:t>model</a:t>
-            </a:r>
-            <a:r>
-              <a:rPr lang="es-MX" dirty="0"/>
-              <a:t> </a:t>
-            </a:r>
-          </a:p>
-          <a:p>
-            <a:r>
-              <a:rPr lang="es-MX" dirty="0" err="1"/>
-              <a:t>Parameter</a:t>
-            </a:r>
-            <a:r>
-              <a:rPr lang="es-MX" dirty="0"/>
-              <a:t> </a:t>
-            </a:r>
-            <a:r>
-              <a:rPr lang="es-MX" dirty="0" err="1"/>
-              <a:t>Tuning</a:t>
-            </a:r>
-            <a:r>
-              <a:rPr lang="es-MX" dirty="0"/>
-              <a:t> </a:t>
-            </a:r>
-          </a:p>
-          <a:p>
-            <a:r>
-              <a:rPr lang="es-MX" dirty="0" err="1"/>
-              <a:t>Write</a:t>
-            </a:r>
-            <a:r>
-              <a:rPr lang="es-MX" dirty="0"/>
-              <a:t> </a:t>
-            </a:r>
-            <a:r>
-              <a:rPr lang="es-MX" dirty="0" err="1"/>
-              <a:t>results</a:t>
-            </a:r>
-            <a:r>
-              <a:rPr lang="es-MX" dirty="0"/>
-              <a:t> </a:t>
-            </a:r>
-          </a:p>
-        </p:txBody>
-      </p:sp>
+          <p:cNvPicPr>
+            <a:picLocks noChangeAspect="1" noChangeArrowheads="1"/>
+          </p:cNvPicPr>
+          <p:nvPr/>
+        </p:nvPicPr>
+        <p:blipFill rotWithShape="1">
+          <a:blip r:embed="rId2">
+            <a:extLst>
+              <a:ext uri="{28A0092B-C50C-407E-A947-70E740481C1C}">
+                <a14:useLocalDpi xmlns:a14="http://schemas.microsoft.com/office/drawing/2010/main" val="0"/>
+              </a:ext>
+            </a:extLst>
+          </a:blip>
+          <a:srcRect t="28917"/>
+          <a:stretch/>
+        </p:blipFill>
+        <p:spPr bwMode="auto">
+          <a:xfrm>
+            <a:off x="1619249" y="2037028"/>
+            <a:ext cx="8810625" cy="4697147"/>
+          </a:xfrm>
+          <a:prstGeom prst="rect">
+            <a:avLst/>
+          </a:prstGeom>
+          <a:noFill/>
+          <a:extLst>
+            <a:ext uri="{909E8E84-426E-40DD-AFC4-6F175D3DCCD1}">
+              <a14:hiddenFill xmlns:a14="http://schemas.microsoft.com/office/drawing/2010/main">
+                <a:solidFill>
+                  <a:srgbClr val="FFFFFF"/>
+                </a:solidFill>
+              </a14:hiddenFill>
+            </a:ext>
+          </a:extLst>
+        </p:spPr>
+      </p:pic>
     </p:spTree>
     <p:extLst>
       <p:ext uri="{BB962C8B-B14F-4D97-AF65-F5344CB8AC3E}">
         <p14:creationId xmlns:p14="http://schemas.microsoft.com/office/powerpoint/2010/main" val="3253452998"/>
-      </p:ext>
-    </p:extLst>
-  </p:cSld>
-  <p:clrMapOvr>
-    <a:masterClrMapping/>
-  </p:clrMapOvr>
-</p:sld>
-</file>
-
-<file path=ppt/slides/slide8.xml><?xml version="1.0" encoding="utf-8"?>
-<p:sld xmlns:a="http://schemas.openxmlformats.org/drawingml/2006/main" xmlns:r="http://schemas.openxmlformats.org/officeDocument/2006/relationships" xmlns:p="http://schemas.openxmlformats.org/presentationml/2006/main">
-  <p:cSld>
-    <p:spTree>
-      <p:nvGrpSpPr>
-        <p:cNvPr id="1" name=""/>
-        <p:cNvGrpSpPr/>
-        <p:nvPr/>
-      </p:nvGrpSpPr>
-      <p:grpSpPr>
-        <a:xfrm>
-          <a:off x="0" y="0"/>
-          <a:ext cx="0" cy="0"/>
-          <a:chOff x="0" y="0"/>
-          <a:chExt cx="0" cy="0"/>
-        </a:xfrm>
-      </p:grpSpPr>
-      <p:sp>
-        <p:nvSpPr>
-          <p:cNvPr id="2" name="Título 1">
-            <a:extLst>
-              <a:ext uri="{FF2B5EF4-FFF2-40B4-BE49-F238E27FC236}">
-                <a16:creationId xmlns:a16="http://schemas.microsoft.com/office/drawing/2014/main" id="{7D751ECC-10AA-4E1F-AFF5-118DB7EB4A2E}"/>
-              </a:ext>
-            </a:extLst>
-          </p:cNvPr>
-          <p:cNvSpPr>
-            <a:spLocks noGrp="1"/>
-          </p:cNvSpPr>
-          <p:nvPr>
-            <p:ph type="title"/>
-          </p:nvPr>
-        </p:nvSpPr>
-        <p:spPr/>
-        <p:txBody>
-          <a:bodyPr/>
-          <a:lstStyle/>
-          <a:p>
-            <a:r>
-              <a:rPr lang="es-MX" dirty="0"/>
-              <a:t>Bibliografía</a:t>
-            </a:r>
-          </a:p>
-        </p:txBody>
-      </p:sp>
-      <p:sp>
-        <p:nvSpPr>
-          <p:cNvPr id="3" name="Marcador de contenido 2">
-            <a:extLst>
-              <a:ext uri="{FF2B5EF4-FFF2-40B4-BE49-F238E27FC236}">
-                <a16:creationId xmlns:a16="http://schemas.microsoft.com/office/drawing/2014/main" id="{B1327A39-2827-450E-BB6E-36696A0FC4BC}"/>
-              </a:ext>
-            </a:extLst>
-          </p:cNvPr>
-          <p:cNvSpPr>
-            <a:spLocks noGrp="1"/>
-          </p:cNvSpPr>
-          <p:nvPr>
-            <p:ph idx="1"/>
-          </p:nvPr>
-        </p:nvSpPr>
-        <p:spPr/>
-        <p:txBody>
-          <a:bodyPr/>
-          <a:lstStyle/>
-          <a:p>
-            <a:r>
-              <a:rPr lang="en-US" sz="1800" i="1" dirty="0" err="1"/>
-              <a:t>Fusto</a:t>
-            </a:r>
-            <a:r>
-              <a:rPr lang="en-US" sz="1800" i="1" dirty="0"/>
-              <a:t>, G. (2020, October 2). Spider bites of medical significance in the Mediterranean area: misdiagnosis, clinical features and management. </a:t>
-            </a:r>
-            <a:r>
-              <a:rPr lang="en-US" sz="1800" i="1" dirty="0" err="1"/>
-              <a:t>SciELO</a:t>
-            </a:r>
-            <a:r>
-              <a:rPr lang="en-US" sz="1800" i="1" dirty="0"/>
-              <a:t> - Scientific Electronic Library Online. Retrieved October 20, 2021, from </a:t>
-            </a:r>
-            <a:r>
-              <a:rPr lang="en-US" sz="1800" i="1" dirty="0">
-                <a:hlinkClick r:id="rId2"/>
-              </a:rPr>
-              <a:t>https://www.scielo.br/j/jvatitd/a/wQrfMGpmjygxpVBGSsFDgRp/?lang=en</a:t>
-            </a:r>
-            <a:endParaRPr lang="en-US" i="1" dirty="0"/>
-          </a:p>
-          <a:p>
-            <a:r>
-              <a:rPr lang="en-US" sz="1800" i="1" dirty="0"/>
-              <a:t>Williams M, Anderson J, Nappe TM. Black Widow Spider Toxicity. [Updated 2021 Aug 11]. In: </a:t>
-            </a:r>
-            <a:r>
-              <a:rPr lang="en-US" sz="1800" i="1" dirty="0" err="1"/>
-              <a:t>StatPearls</a:t>
-            </a:r>
-            <a:r>
-              <a:rPr lang="en-US" sz="1800" i="1" dirty="0"/>
-              <a:t> [Internet]. Treasure Island (FL): </a:t>
-            </a:r>
-            <a:r>
-              <a:rPr lang="en-US" sz="1800" i="1" dirty="0" err="1"/>
-              <a:t>StatPearls</a:t>
-            </a:r>
-            <a:r>
-              <a:rPr lang="en-US" sz="1800" i="1" dirty="0"/>
-              <a:t> Publishing; 2021 Jan-. Available from: </a:t>
-            </a:r>
-            <a:r>
-              <a:rPr lang="en-US" sz="1800" i="1" dirty="0">
-                <a:hlinkClick r:id="rId3"/>
-              </a:rPr>
-              <a:t>https://www.ncbi.nlm.nih.gov/books/NBK499987/</a:t>
-            </a:r>
-            <a:endParaRPr lang="en-US" sz="1800" i="1" dirty="0"/>
-          </a:p>
-          <a:p>
-            <a:endParaRPr lang="es-MX" dirty="0"/>
-          </a:p>
-        </p:txBody>
-      </p:sp>
-    </p:spTree>
-    <p:extLst>
-      <p:ext uri="{BB962C8B-B14F-4D97-AF65-F5344CB8AC3E}">
-        <p14:creationId xmlns:p14="http://schemas.microsoft.com/office/powerpoint/2010/main" val="3682137547"/>
       </p:ext>
     </p:extLst>
   </p:cSld>

</xml_diff>